<commit_message>
change code for "ctr"
</commit_message>
<xml_diff>
--- a/app/example.pptx
+++ b/app/example.pptx
@@ -199,18 +199,18 @@
   <pc:docChgLst>
     <pc:chgData name="西村　光太郎" userId="0dbf675c-9aa6-4933-9892-9db2f940254e" providerId="ADAL" clId="{DE715873-F39B-43F8-868F-4C6FCB1725AD}"/>
     <pc:docChg chg="modSld">
-      <pc:chgData name="西村　光太郎" userId="0dbf675c-9aa6-4933-9892-9db2f940254e" providerId="ADAL" clId="{DE715873-F39B-43F8-868F-4C6FCB1725AD}" dt="2023-11-21T05:35:13.653" v="56" actId="20577"/>
+      <pc:chgData name="西村　光太郎" userId="0dbf675c-9aa6-4933-9892-9db2f940254e" providerId="ADAL" clId="{DE715873-F39B-43F8-868F-4C6FCB1725AD}" dt="2023-11-21T06:45:15.483" v="60" actId="14100"/>
       <pc:docMkLst>
         <pc:docMk/>
       </pc:docMkLst>
       <pc:sldChg chg="addSp modSp mod">
-        <pc:chgData name="西村　光太郎" userId="0dbf675c-9aa6-4933-9892-9db2f940254e" providerId="ADAL" clId="{DE715873-F39B-43F8-868F-4C6FCB1725AD}" dt="2023-11-21T05:35:13.653" v="56" actId="20577"/>
+        <pc:chgData name="西村　光太郎" userId="0dbf675c-9aa6-4933-9892-9db2f940254e" providerId="ADAL" clId="{DE715873-F39B-43F8-868F-4C6FCB1725AD}" dt="2023-11-21T06:45:15.483" v="60" actId="14100"/>
         <pc:sldMkLst>
           <pc:docMk/>
           <pc:sldMk cId="1018794165" sldId="256"/>
         </pc:sldMkLst>
         <pc:spChg chg="add mod">
-          <ac:chgData name="西村　光太郎" userId="0dbf675c-9aa6-4933-9892-9db2f940254e" providerId="ADAL" clId="{DE715873-F39B-43F8-868F-4C6FCB1725AD}" dt="2023-11-21T05:35:13.653" v="56" actId="20577"/>
+          <ac:chgData name="西村　光太郎" userId="0dbf675c-9aa6-4933-9892-9db2f940254e" providerId="ADAL" clId="{DE715873-F39B-43F8-868F-4C6FCB1725AD}" dt="2023-11-21T06:45:15.483" v="60" actId="14100"/>
           <ac:spMkLst>
             <pc:docMk/>
             <pc:sldMk cId="1018794165" sldId="256"/>
@@ -9751,7 +9751,7 @@
         <p:spPr>
           <a:xfrm>
             <a:off x="1947333" y="2497667"/>
-            <a:ext cx="3716082" cy="369332"/>
+            <a:ext cx="5347989" cy="646331"/>
           </a:xfrm>
           <a:prstGeom prst="rect">
             <a:avLst/>
@@ -9759,21 +9759,44 @@
           <a:noFill/>
         </p:spPr>
         <p:txBody>
-          <a:bodyPr wrap="none" rtlCol="0">
+          <a:bodyPr wrap="square" rtlCol="0">
             <a:spAutoFit/>
           </a:bodyPr>
           <a:lstStyle/>
           <a:p>
             <a:r>
-              <a:rPr kumimoji="1" lang="ja-JP" altLang="en-US"/>
-              <a:t>これは、一枚目のスライドです</a:t>
-            </a:r>
-            <a:r>
-              <a:rPr lang="ja-JP" altLang="en-US"/>
+              <a:rPr kumimoji="1" lang="ja-JP" altLang="en-US" dirty="0"/>
+              <a:t>これは</a:t>
+            </a:r>
+            <a:r>
+              <a:rPr lang="ja-JP" altLang="en-US" b="0" dirty="0">
+                <a:solidFill>
+                  <a:srgbClr val="CE9178"/>
+                </a:solidFill>
+                <a:effectLst/>
+                <a:latin typeface="Consolas" panose="020B0609020204030204" pitchFamily="49" charset="0"/>
+              </a:rPr>
+              <a:t>、</a:t>
+            </a:r>
+            <a:endParaRPr lang="ja-JP" altLang="en-US" b="0" dirty="0">
+              <a:solidFill>
+                <a:srgbClr val="D4D4D4"/>
+              </a:solidFill>
+              <a:effectLst/>
+              <a:latin typeface="Consolas" panose="020B0609020204030204" pitchFamily="49" charset="0"/>
+            </a:endParaRPr>
+          </a:p>
+          <a:p>
+            <a:r>
+              <a:rPr kumimoji="1" lang="ja-JP" altLang="en-US" dirty="0"/>
+              <a:t>　一枚目のスライドです</a:t>
+            </a:r>
+            <a:r>
+              <a:rPr lang="ja-JP" altLang="en-US" dirty="0"/>
               <a:t> </a:t>
             </a:r>
             <a:r>
-              <a:rPr kumimoji="1" lang="ja-JP" altLang="en-US"/>
+              <a:rPr kumimoji="1" lang="ja-JP" altLang="en-US" dirty="0"/>
               <a:t>。</a:t>
             </a:r>
           </a:p>

</xml_diff>